<commit_message>
2nd change just copy
</commit_message>
<xml_diff>
--- a/day-16.pptx
+++ b/day-16.pptx
@@ -5,7 +5,7 @@
     <p:sldMasterId id="2147483659" r:id="rId1"/>
   </p:sldMasterIdLst>
   <p:notesMasterIdLst>
-    <p:notesMasterId r:id="rId12"/>
+    <p:notesMasterId r:id="rId13"/>
   </p:notesMasterIdLst>
   <p:sldIdLst>
     <p:sldId id="256" r:id="rId2"/>
@@ -18,23 +18,24 @@
     <p:sldId id="263" r:id="rId9"/>
     <p:sldId id="264" r:id="rId10"/>
     <p:sldId id="265" r:id="rId11"/>
+    <p:sldId id="266" r:id="rId12"/>
   </p:sldIdLst>
   <p:sldSz cx="9144000" cy="5143500" type="screen16x9"/>
   <p:notesSz cx="6858000" cy="9144000"/>
   <p:embeddedFontLst>
     <p:embeddedFont>
       <p:font typeface="Lato" panose="020F0502020204030203" pitchFamily="34" charset="0"/>
-      <p:regular r:id="rId13"/>
-      <p:bold r:id="rId14"/>
-      <p:italic r:id="rId15"/>
-      <p:boldItalic r:id="rId16"/>
+      <p:regular r:id="rId14"/>
+      <p:bold r:id="rId15"/>
+      <p:italic r:id="rId16"/>
+      <p:boldItalic r:id="rId17"/>
     </p:embeddedFont>
     <p:embeddedFont>
       <p:font typeface="Montserrat" panose="00000500000000000000" pitchFamily="2" charset="0"/>
-      <p:regular r:id="rId17"/>
-      <p:bold r:id="rId18"/>
-      <p:italic r:id="rId19"/>
-      <p:boldItalic r:id="rId20"/>
+      <p:regular r:id="rId18"/>
+      <p:bold r:id="rId19"/>
+      <p:italic r:id="rId20"/>
+      <p:boldItalic r:id="rId21"/>
     </p:embeddedFont>
   </p:embeddedFontLst>
   <p:defaultTextStyle>
@@ -930,6 +931,133 @@
     <p:extLst>
       <p:ext uri="{BB962C8B-B14F-4D97-AF65-F5344CB8AC3E}">
         <p14:creationId xmlns:p14="http://schemas.microsoft.com/office/powerpoint/2010/main" val="2083176936"/>
+      </p:ext>
+    </p:extLst>
+  </p:cSld>
+  <p:clrMapOvr>
+    <a:masterClrMapping/>
+  </p:clrMapOvr>
+</p:notes>
+</file>
+
+<file path=ppt/notesSlides/notesSlide11.xml><?xml version="1.0" encoding="utf-8"?>
+<p:notes xmlns:a="http://schemas.openxmlformats.org/drawingml/2006/main" xmlns:r="http://schemas.openxmlformats.org/officeDocument/2006/relationships" xmlns:p="http://schemas.openxmlformats.org/presentationml/2006/main" showMasterSp="0" showMasterPhAnim="0">
+  <p:cSld>
+    <p:spTree>
+      <p:nvGrpSpPr>
+        <p:cNvPr id="1" name="Shape 136">
+          <a:extLst>
+            <a:ext uri="{FF2B5EF4-FFF2-40B4-BE49-F238E27FC236}">
+              <a16:creationId xmlns:a16="http://schemas.microsoft.com/office/drawing/2014/main" id="{A3BEF20D-E674-45E2-8FB8-891D49BC386B}"/>
+            </a:ext>
+          </a:extLst>
+        </p:cNvPr>
+        <p:cNvGrpSpPr/>
+        <p:nvPr/>
+      </p:nvGrpSpPr>
+      <p:grpSpPr>
+        <a:xfrm>
+          <a:off x="0" y="0"/>
+          <a:ext cx="0" cy="0"/>
+          <a:chOff x="0" y="0"/>
+          <a:chExt cx="0" cy="0"/>
+        </a:xfrm>
+      </p:grpSpPr>
+      <p:sp>
+        <p:nvSpPr>
+          <p:cNvPr id="137" name="Google Shape;137;g25bab48cd4d_0_125:notes">
+            <a:extLst>
+              <a:ext uri="{FF2B5EF4-FFF2-40B4-BE49-F238E27FC236}">
+                <a16:creationId xmlns:a16="http://schemas.microsoft.com/office/drawing/2014/main" id="{ED5582B2-149C-CD05-FC3E-BFC63A599C0F}"/>
+              </a:ext>
+            </a:extLst>
+          </p:cNvPr>
+          <p:cNvSpPr>
+            <a:spLocks noGrp="1" noRot="1" noChangeAspect="1"/>
+          </p:cNvSpPr>
+          <p:nvPr>
+            <p:ph type="sldImg" idx="2"/>
+          </p:nvPr>
+        </p:nvSpPr>
+        <p:spPr>
+          <a:xfrm>
+            <a:off x="381000" y="685800"/>
+            <a:ext cx="6096000" cy="3429000"/>
+          </a:xfrm>
+          <a:custGeom>
+            <a:avLst/>
+            <a:gdLst/>
+            <a:ahLst/>
+            <a:cxnLst/>
+            <a:rect l="l" t="t" r="r" b="b"/>
+            <a:pathLst>
+              <a:path w="120000" h="120000" extrusionOk="0">
+                <a:moveTo>
+                  <a:pt x="0" y="0"/>
+                </a:moveTo>
+                <a:lnTo>
+                  <a:pt x="120000" y="0"/>
+                </a:lnTo>
+                <a:lnTo>
+                  <a:pt x="120000" y="120000"/>
+                </a:lnTo>
+                <a:lnTo>
+                  <a:pt x="0" y="120000"/>
+                </a:lnTo>
+                <a:close/>
+              </a:path>
+            </a:pathLst>
+          </a:custGeom>
+        </p:spPr>
+      </p:sp>
+      <p:sp>
+        <p:nvSpPr>
+          <p:cNvPr id="138" name="Google Shape;138;g25bab48cd4d_0_125:notes">
+            <a:extLst>
+              <a:ext uri="{FF2B5EF4-FFF2-40B4-BE49-F238E27FC236}">
+                <a16:creationId xmlns:a16="http://schemas.microsoft.com/office/drawing/2014/main" id="{BD187A49-6A05-3E69-E675-33CD46813B02}"/>
+              </a:ext>
+            </a:extLst>
+          </p:cNvPr>
+          <p:cNvSpPr txBox="1">
+            <a:spLocks noGrp="1"/>
+          </p:cNvSpPr>
+          <p:nvPr>
+            <p:ph type="body" idx="1"/>
+          </p:nvPr>
+        </p:nvSpPr>
+        <p:spPr>
+          <a:xfrm>
+            <a:off x="685800" y="4343400"/>
+            <a:ext cx="5486400" cy="4114800"/>
+          </a:xfrm>
+          <a:prstGeom prst="rect">
+            <a:avLst/>
+          </a:prstGeom>
+        </p:spPr>
+        <p:txBody>
+          <a:bodyPr spcFirstLastPara="1" wrap="square" lIns="91425" tIns="91425" rIns="91425" bIns="91425" anchor="t" anchorCtr="0">
+            <a:noAutofit/>
+          </a:bodyPr>
+          <a:lstStyle/>
+          <a:p>
+            <a:pPr marL="0" lvl="0" indent="0" algn="l" rtl="0">
+              <a:spcBef>
+                <a:spcPts val="0"/>
+              </a:spcBef>
+              <a:spcAft>
+                <a:spcPts val="0"/>
+              </a:spcAft>
+              <a:buNone/>
+            </a:pPr>
+            <a:endParaRPr/>
+          </a:p>
+        </p:txBody>
+      </p:sp>
+    </p:spTree>
+    <p:extLst>
+      <p:ext uri="{BB962C8B-B14F-4D97-AF65-F5344CB8AC3E}">
+        <p14:creationId xmlns:p14="http://schemas.microsoft.com/office/powerpoint/2010/main" val="3970497288"/>
       </p:ext>
     </p:extLst>
   </p:cSld>
@@ -10090,6 +10218,120 @@
 </p:sld>
 </file>
 
+<file path=ppt/slides/slide11.xml><?xml version="1.0" encoding="utf-8"?>
+<p:sld xmlns:a="http://schemas.openxmlformats.org/drawingml/2006/main" xmlns:r="http://schemas.openxmlformats.org/officeDocument/2006/relationships" xmlns:p="http://schemas.openxmlformats.org/presentationml/2006/main">
+  <p:cSld>
+    <p:spTree>
+      <p:nvGrpSpPr>
+        <p:cNvPr id="1" name="Shape 139">
+          <a:extLst>
+            <a:ext uri="{FF2B5EF4-FFF2-40B4-BE49-F238E27FC236}">
+              <a16:creationId xmlns:a16="http://schemas.microsoft.com/office/drawing/2014/main" id="{A5F5A8EB-91F9-293F-64DE-34E2BC6C7EDE}"/>
+            </a:ext>
+          </a:extLst>
+        </p:cNvPr>
+        <p:cNvGrpSpPr/>
+        <p:nvPr/>
+      </p:nvGrpSpPr>
+      <p:grpSpPr>
+        <a:xfrm>
+          <a:off x="0" y="0"/>
+          <a:ext cx="0" cy="0"/>
+          <a:chOff x="0" y="0"/>
+          <a:chExt cx="0" cy="0"/>
+        </a:xfrm>
+      </p:grpSpPr>
+      <p:sp>
+        <p:nvSpPr>
+          <p:cNvPr id="140" name="Google Shape;140;p14">
+            <a:extLst>
+              <a:ext uri="{FF2B5EF4-FFF2-40B4-BE49-F238E27FC236}">
+                <a16:creationId xmlns:a16="http://schemas.microsoft.com/office/drawing/2014/main" id="{B042E117-2C86-B8D8-2FEC-DC1B9052583F}"/>
+              </a:ext>
+            </a:extLst>
+          </p:cNvPr>
+          <p:cNvSpPr txBox="1">
+            <a:spLocks noGrp="1"/>
+          </p:cNvSpPr>
+          <p:nvPr>
+            <p:ph type="title"/>
+          </p:nvPr>
+        </p:nvSpPr>
+        <p:spPr>
+          <a:xfrm>
+            <a:off x="2375449" y="74177"/>
+            <a:ext cx="4144297" cy="914100"/>
+          </a:xfrm>
+          <a:prstGeom prst="rect">
+            <a:avLst/>
+          </a:prstGeom>
+        </p:spPr>
+        <p:txBody>
+          <a:bodyPr spcFirstLastPara="1" wrap="square" lIns="91425" tIns="91425" rIns="91425" bIns="91425" anchor="t" anchorCtr="0">
+            <a:normAutofit/>
+          </a:bodyPr>
+          <a:lstStyle/>
+          <a:p>
+            <a:pPr marL="0" lvl="0" indent="0" algn="l" rtl="0">
+              <a:spcBef>
+                <a:spcPts val="0"/>
+              </a:spcBef>
+              <a:spcAft>
+                <a:spcPts val="0"/>
+              </a:spcAft>
+              <a:buNone/>
+            </a:pPr>
+            <a:r>
+              <a:rPr lang="en-US"/>
+              <a:t>Map Chart - copy</a:t>
+            </a:r>
+            <a:endParaRPr dirty="0"/>
+          </a:p>
+        </p:txBody>
+      </p:sp>
+      <p:pic>
+        <p:nvPicPr>
+          <p:cNvPr id="3" name="Picture 2">
+            <a:extLst>
+              <a:ext uri="{FF2B5EF4-FFF2-40B4-BE49-F238E27FC236}">
+                <a16:creationId xmlns:a16="http://schemas.microsoft.com/office/drawing/2014/main" id="{6ACF8CEA-F045-8FB4-6A9E-52E4BA3B3EB7}"/>
+              </a:ext>
+            </a:extLst>
+          </p:cNvPr>
+          <p:cNvPicPr>
+            <a:picLocks noChangeAspect="1"/>
+          </p:cNvPicPr>
+          <p:nvPr/>
+        </p:nvPicPr>
+        <p:blipFill>
+          <a:blip r:embed="rId3"/>
+          <a:stretch>
+            <a:fillRect/>
+          </a:stretch>
+        </p:blipFill>
+        <p:spPr>
+          <a:xfrm>
+            <a:off x="1189462" y="988277"/>
+            <a:ext cx="7761249" cy="4008401"/>
+          </a:xfrm>
+          <a:prstGeom prst="rect">
+            <a:avLst/>
+          </a:prstGeom>
+        </p:spPr>
+      </p:pic>
+    </p:spTree>
+    <p:extLst>
+      <p:ext uri="{BB962C8B-B14F-4D97-AF65-F5344CB8AC3E}">
+        <p14:creationId xmlns:p14="http://schemas.microsoft.com/office/powerpoint/2010/main" val="4236547249"/>
+      </p:ext>
+    </p:extLst>
+  </p:cSld>
+  <p:clrMapOvr>
+    <a:masterClrMapping/>
+  </p:clrMapOvr>
+</p:sld>
+</file>
+
 <file path=ppt/slides/slide2.xml><?xml version="1.0" encoding="utf-8"?>
 <p:sld xmlns:a="http://schemas.openxmlformats.org/drawingml/2006/main" xmlns:r="http://schemas.openxmlformats.org/officeDocument/2006/relationships" xmlns:p="http://schemas.openxmlformats.org/presentationml/2006/main">
   <p:cSld>

</xml_diff>